<commit_message>
Upload Presentation PDF + PPTX
</commit_message>
<xml_diff>
--- a/Presentazioni/2.1_GEOx.pptx
+++ b/Presentazioni/2.1_GEOx.pptx
@@ -8,11 +8,11 @@
     <p:sldId id="256" r:id="rId2"/>
     <p:sldId id="257" r:id="rId3"/>
     <p:sldId id="263" r:id="rId4"/>
-    <p:sldId id="258" r:id="rId5"/>
-    <p:sldId id="259" r:id="rId6"/>
-    <p:sldId id="260" r:id="rId7"/>
-    <p:sldId id="261" r:id="rId8"/>
-    <p:sldId id="262" r:id="rId9"/>
+    <p:sldId id="264" r:id="rId5"/>
+    <p:sldId id="258" r:id="rId6"/>
+    <p:sldId id="259" r:id="rId7"/>
+    <p:sldId id="260" r:id="rId8"/>
+    <p:sldId id="261" r:id="rId9"/>
   </p:sldIdLst>
   <p:sldSz cx="12192000" cy="6858000"/>
   <p:notesSz cx="6858000" cy="9144000"/>
@@ -3880,7 +3880,7 @@
         </p:nvSpPr>
         <p:spPr>
           <a:xfrm>
-            <a:off x="2664856" y="1129485"/>
+            <a:off x="2664854" y="1389812"/>
             <a:ext cx="1786055" cy="400110"/>
           </a:xfrm>
           <a:prstGeom prst="rect">
@@ -3907,41 +3907,6 @@
           </a:p>
         </p:txBody>
       </p:sp>
-      <p:pic>
-        <p:nvPicPr>
-          <p:cNvPr id="6" name="Immagine 5">
-            <a:extLst>
-              <a:ext uri="{FF2B5EF4-FFF2-40B4-BE49-F238E27FC236}">
-                <a16:creationId xmlns:a16="http://schemas.microsoft.com/office/drawing/2014/main" id="{327769A4-409D-4054-B003-69AD3C340196}"/>
-              </a:ext>
-            </a:extLst>
-          </p:cNvPr>
-          <p:cNvPicPr>
-            <a:picLocks noChangeAspect="1"/>
-          </p:cNvPicPr>
-          <p:nvPr/>
-        </p:nvPicPr>
-        <p:blipFill rotWithShape="1">
-          <a:blip r:embed="rId2">
-            <a:extLst>
-              <a:ext uri="{28A0092B-C50C-407E-A947-70E740481C1C}">
-                <a14:useLocalDpi xmlns:a14="http://schemas.microsoft.com/office/drawing/2010/main" val="0"/>
-              </a:ext>
-            </a:extLst>
-          </a:blip>
-          <a:srcRect t="351" b="90037"/>
-          <a:stretch/>
-        </p:blipFill>
-        <p:spPr>
-          <a:xfrm>
-            <a:off x="218660" y="5968424"/>
-            <a:ext cx="11754678" cy="651387"/>
-          </a:xfrm>
-          <a:prstGeom prst="rect">
-            <a:avLst/>
-          </a:prstGeom>
-        </p:spPr>
-      </p:pic>
       <p:sp>
         <p:nvSpPr>
           <p:cNvPr id="7" name="CasellaDiTesto 6">
@@ -3956,7 +3921,7 @@
         </p:nvSpPr>
         <p:spPr>
           <a:xfrm>
-            <a:off x="619216" y="1591371"/>
+            <a:off x="619212" y="2182772"/>
             <a:ext cx="5877340" cy="3785652"/>
           </a:xfrm>
           <a:prstGeom prst="rect">
@@ -4041,7 +4006,7 @@
               <a:rPr lang="it-IT" sz="2000" dirty="0">
                 <a:latin typeface="Franklin Gothic Book" panose="020B0503020102020204" pitchFamily="34" charset="0"/>
               </a:rPr>
-              <a:t>.</a:t>
+              <a:t>. (I duplicati vengono rimossi)</a:t>
             </a:r>
           </a:p>
           <a:p>
@@ -4090,7 +4055,7 @@
         </p:nvSpPr>
         <p:spPr>
           <a:xfrm>
-            <a:off x="6897111" y="1834190"/>
+            <a:off x="6897111" y="2271721"/>
             <a:ext cx="5042452" cy="3539430"/>
           </a:xfrm>
           <a:prstGeom prst="rect">
@@ -4519,7 +4484,7 @@
         </p:nvSpPr>
         <p:spPr>
           <a:xfrm>
-            <a:off x="2746189" y="1092138"/>
+            <a:off x="2746189" y="1389812"/>
             <a:ext cx="1623392" cy="400110"/>
           </a:xfrm>
           <a:prstGeom prst="rect">
@@ -4560,8 +4525,8 @@
         </p:nvSpPr>
         <p:spPr>
           <a:xfrm>
-            <a:off x="619215" y="1587424"/>
-            <a:ext cx="5877340" cy="2862322"/>
+            <a:off x="619215" y="2182772"/>
+            <a:ext cx="5877340" cy="3785652"/>
           </a:xfrm>
           <a:prstGeom prst="rect">
             <a:avLst/>
@@ -4657,6 +4622,18 @@
               <a:t>Infine, si è collegato il dataset principale con il nuovo set di dati, associandone l’ID.</a:t>
             </a:r>
           </a:p>
+          <a:p>
+            <a:pPr marL="1200150" lvl="2" indent="-285750">
+              <a:buFont typeface="Wingdings" panose="05000000000000000000" pitchFamily="2" charset="2"/>
+              <a:buChar char="§"/>
+            </a:pPr>
+            <a:r>
+              <a:rPr lang="it-IT" sz="2000" dirty="0">
+                <a:latin typeface="Franklin Gothic Book" panose="020B0503020102020204" pitchFamily="34" charset="0"/>
+              </a:rPr>
+              <a:t>In aggiunta, abbiamo generato una struttura dati per contenere le informazioni relative all’area geografica.</a:t>
+            </a:r>
+          </a:p>
         </p:txBody>
       </p:sp>
       <p:sp>
@@ -4673,8 +4650,8 @@
         </p:nvSpPr>
         <p:spPr>
           <a:xfrm>
-            <a:off x="6897111" y="1587424"/>
-            <a:ext cx="5042452" cy="2462213"/>
+            <a:off x="6897111" y="2736770"/>
+            <a:ext cx="5042452" cy="2677656"/>
           </a:xfrm>
           <a:prstGeom prst="rect">
             <a:avLst/>
@@ -4708,47 +4685,145 @@
             </a:endParaRPr>
           </a:p>
           <a:p>
+            <a:r>
+              <a:rPr lang="en-US" sz="1400" dirty="0">
+                <a:latin typeface="Consolas" panose="020B0609020204030204" pitchFamily="49" charset="0"/>
+              </a:rPr>
+              <a:t>tedx_dataset_agg3 = tedx_dataset_agg2</a:t>
+            </a:r>
+          </a:p>
+          <a:p>
+            <a:r>
+              <a:rPr lang="en-US" sz="1400" dirty="0">
+                <a:latin typeface="Consolas" panose="020B0609020204030204" pitchFamily="49" charset="0"/>
+              </a:rPr>
+              <a:t>.</a:t>
+            </a:r>
+            <a:r>
+              <a:rPr lang="en-US" sz="1400" dirty="0">
+                <a:solidFill>
+                  <a:srgbClr val="FF5050"/>
+                </a:solidFill>
+                <a:latin typeface="Consolas" panose="020B0609020204030204" pitchFamily="49" charset="0"/>
+              </a:rPr>
+              <a:t>join</a:t>
+            </a:r>
+            <a:r>
+              <a:rPr lang="en-US" sz="1400" dirty="0">
+                <a:latin typeface="Consolas" panose="020B0609020204030204" pitchFamily="49" charset="0"/>
+              </a:rPr>
+              <a:t>(geo_dataset_agg3, tedx_dataset_agg2._id == geo_dataset_agg3.idx, "left")</a:t>
+            </a:r>
+          </a:p>
+          <a:p>
+            <a:r>
+              <a:rPr lang="en-US" sz="1400" dirty="0">
+                <a:latin typeface="Consolas" panose="020B0609020204030204" pitchFamily="49" charset="0"/>
+              </a:rPr>
+              <a:t>.</a:t>
+            </a:r>
+            <a:r>
+              <a:rPr lang="en-US" sz="1400" dirty="0">
+                <a:solidFill>
+                  <a:srgbClr val="FF5050"/>
+                </a:solidFill>
+                <a:latin typeface="Consolas" panose="020B0609020204030204" pitchFamily="49" charset="0"/>
+              </a:rPr>
+              <a:t>select</a:t>
+            </a:r>
+            <a:r>
+              <a:rPr lang="en-US" sz="1400" dirty="0">
+                <a:latin typeface="Consolas" panose="020B0609020204030204" pitchFamily="49" charset="0"/>
+              </a:rPr>
+              <a:t>(col("*"), struct(col("continent"),</a:t>
+            </a:r>
+          </a:p>
+          <a:p>
+            <a:r>
+              <a:rPr lang="en-US" sz="1400" dirty="0">
+                <a:latin typeface="Consolas" panose="020B0609020204030204" pitchFamily="49" charset="0"/>
+              </a:rPr>
+              <a:t>col("nation"),col("city")).</a:t>
+            </a:r>
+            <a:r>
+              <a:rPr lang="en-US" sz="1400" dirty="0">
+                <a:solidFill>
+                  <a:srgbClr val="FF5050"/>
+                </a:solidFill>
+                <a:latin typeface="Consolas" panose="020B0609020204030204" pitchFamily="49" charset="0"/>
+              </a:rPr>
+              <a:t>alias</a:t>
+            </a:r>
+            <a:r>
+              <a:rPr lang="en-US" sz="1400" dirty="0">
+                <a:latin typeface="Consolas" panose="020B0609020204030204" pitchFamily="49" charset="0"/>
+              </a:rPr>
+              <a:t>("</a:t>
+            </a:r>
+            <a:r>
+              <a:rPr lang="en-US" sz="1400" dirty="0" err="1">
+                <a:latin typeface="Consolas" panose="020B0609020204030204" pitchFamily="49" charset="0"/>
+              </a:rPr>
+              <a:t>geo_area</a:t>
+            </a:r>
+            <a:r>
+              <a:rPr lang="en-US" sz="1400" dirty="0">
+                <a:latin typeface="Consolas" panose="020B0609020204030204" pitchFamily="49" charset="0"/>
+              </a:rPr>
+              <a:t>"))</a:t>
+            </a:r>
+          </a:p>
+          <a:p>
+            <a:r>
+              <a:rPr lang="en-US" sz="1400" dirty="0">
+                <a:latin typeface="Consolas" panose="020B0609020204030204" pitchFamily="49" charset="0"/>
+              </a:rPr>
+              <a:t>.</a:t>
+            </a:r>
+            <a:r>
+              <a:rPr lang="en-US" sz="1400" dirty="0">
+                <a:solidFill>
+                  <a:srgbClr val="FF5050"/>
+                </a:solidFill>
+                <a:latin typeface="Consolas" panose="020B0609020204030204" pitchFamily="49" charset="0"/>
+              </a:rPr>
+              <a:t>drop</a:t>
+            </a:r>
+            <a:r>
+              <a:rPr lang="en-US" sz="1400" dirty="0">
+                <a:latin typeface="Consolas" panose="020B0609020204030204" pitchFamily="49" charset="0"/>
+              </a:rPr>
+              <a:t>("</a:t>
+            </a:r>
+            <a:r>
+              <a:rPr lang="en-US" sz="1400" dirty="0" err="1">
+                <a:latin typeface="Consolas" panose="020B0609020204030204" pitchFamily="49" charset="0"/>
+              </a:rPr>
+              <a:t>idx</a:t>
+            </a:r>
+            <a:r>
+              <a:rPr lang="en-US" sz="1400" dirty="0">
+                <a:latin typeface="Consolas" panose="020B0609020204030204" pitchFamily="49" charset="0"/>
+              </a:rPr>
+              <a:t>","</a:t>
+            </a:r>
+            <a:r>
+              <a:rPr lang="en-US" sz="1400" dirty="0" err="1">
+                <a:latin typeface="Consolas" panose="020B0609020204030204" pitchFamily="49" charset="0"/>
+              </a:rPr>
+              <a:t>continent","nation","city</a:t>
+            </a:r>
+            <a:r>
+              <a:rPr lang="en-US" sz="1400" dirty="0">
+                <a:latin typeface="Consolas" panose="020B0609020204030204" pitchFamily="49" charset="0"/>
+              </a:rPr>
+              <a:t>")</a:t>
+            </a:r>
             <a:endParaRPr lang="it-IT" sz="1400" dirty="0">
               <a:latin typeface="Consolas" panose="020B0609020204030204" pitchFamily="49" charset="0"/>
             </a:endParaRPr>
           </a:p>
           <a:p>
-            <a:r>
-              <a:rPr lang="it-IT" sz="1400" dirty="0">
-                <a:latin typeface="Consolas" panose="020B0609020204030204" pitchFamily="49" charset="0"/>
-              </a:rPr>
-              <a:t>tedx_dataset_agg3 = tedx_dataset_agg2</a:t>
-            </a:r>
-          </a:p>
-          <a:p>
-            <a:r>
-              <a:rPr lang="it-IT" sz="1400" dirty="0">
-                <a:latin typeface="Consolas" panose="020B0609020204030204" pitchFamily="49" charset="0"/>
-              </a:rPr>
-              <a:t>.join(geo_dataset_agg3, tedx_dataset_agg2._id == geo_dataset_agg3.idx, "</a:t>
-            </a:r>
-            <a:r>
-              <a:rPr lang="it-IT" sz="1400" dirty="0" err="1">
-                <a:latin typeface="Consolas" panose="020B0609020204030204" pitchFamily="49" charset="0"/>
-              </a:rPr>
-              <a:t>left</a:t>
-            </a:r>
-            <a:r>
-              <a:rPr lang="it-IT" sz="1400" dirty="0">
-                <a:latin typeface="Consolas" panose="020B0609020204030204" pitchFamily="49" charset="0"/>
-              </a:rPr>
-              <a:t>")</a:t>
-            </a:r>
-          </a:p>
-          <a:p>
-            <a:r>
-              <a:rPr lang="it-IT" sz="1400" dirty="0">
-                <a:latin typeface="Consolas" panose="020B0609020204030204" pitchFamily="49" charset="0"/>
-              </a:rPr>
-              <a:t>.drop("idx")</a:t>
-            </a:r>
-          </a:p>
-          <a:p>
             <a:endParaRPr lang="it-IT" sz="1400" dirty="0">
               <a:latin typeface="Consolas" panose="020B0609020204030204" pitchFamily="49" charset="0"/>
             </a:endParaRPr>
@@ -4765,41 +4840,6 @@
           </a:p>
         </p:txBody>
       </p:sp>
-      <p:pic>
-        <p:nvPicPr>
-          <p:cNvPr id="10" name="Immagine 9" descr="Immagine che contiene verde&#10;&#10;Descrizione generata automaticamente">
-            <a:extLst>
-              <a:ext uri="{FF2B5EF4-FFF2-40B4-BE49-F238E27FC236}">
-                <a16:creationId xmlns:a16="http://schemas.microsoft.com/office/drawing/2014/main" id="{5D8E1BFE-3606-4973-A264-3AEF6B2577A5}"/>
-              </a:ext>
-            </a:extLst>
-          </p:cNvPr>
-          <p:cNvPicPr>
-            <a:picLocks noChangeAspect="1"/>
-          </p:cNvPicPr>
-          <p:nvPr/>
-        </p:nvPicPr>
-        <p:blipFill rotWithShape="1">
-          <a:blip r:embed="rId2">
-            <a:extLst>
-              <a:ext uri="{28A0092B-C50C-407E-A947-70E740481C1C}">
-                <a14:useLocalDpi xmlns:a14="http://schemas.microsoft.com/office/drawing/2010/main" val="0"/>
-              </a:ext>
-            </a:extLst>
-          </a:blip>
-          <a:srcRect t="1" b="81321"/>
-          <a:stretch/>
-        </p:blipFill>
-        <p:spPr>
-          <a:xfrm>
-            <a:off x="1618625" y="5253711"/>
-            <a:ext cx="8954750" cy="1209923"/>
-          </a:xfrm>
-          <a:prstGeom prst="rect">
-            <a:avLst/>
-          </a:prstGeom>
-        </p:spPr>
-      </p:pic>
     </p:spTree>
     <p:extLst>
       <p:ext uri="{BB962C8B-B14F-4D97-AF65-F5344CB8AC3E}">
@@ -4897,7 +4937,7 @@
         <p:spPr>
           <a:xfrm>
             <a:off x="218661" y="889576"/>
-            <a:ext cx="6221896" cy="107386"/>
+            <a:ext cx="6678450" cy="107386"/>
           </a:xfrm>
           <a:prstGeom prst="rect">
             <a:avLst/>
@@ -4936,90 +4976,10 @@
       </p:sp>
       <p:sp>
         <p:nvSpPr>
-          <p:cNvPr id="3" name="CasellaDiTesto 2">
-            <a:extLst>
-              <a:ext uri="{FF2B5EF4-FFF2-40B4-BE49-F238E27FC236}">
-                <a16:creationId xmlns:a16="http://schemas.microsoft.com/office/drawing/2014/main" id="{723CDE17-946A-423A-828D-CF9D21915D40}"/>
-              </a:ext>
-            </a:extLst>
-          </p:cNvPr>
-          <p:cNvSpPr txBox="1"/>
-          <p:nvPr/>
-        </p:nvSpPr>
-        <p:spPr>
-          <a:xfrm>
-            <a:off x="1225511" y="211613"/>
-            <a:ext cx="4208195" cy="584775"/>
-          </a:xfrm>
-          <a:prstGeom prst="rect">
-            <a:avLst/>
-          </a:prstGeom>
-          <a:noFill/>
-        </p:spPr>
-        <p:txBody>
-          <a:bodyPr wrap="square" rtlCol="0">
-            <a:spAutoFit/>
-          </a:bodyPr>
-          <a:lstStyle/>
-          <a:p>
-            <a:pPr algn="ctr"/>
-            <a:r>
-              <a:rPr lang="it-IT" sz="3200" dirty="0">
-                <a:solidFill>
-                  <a:schemeClr val="tx1">
-                    <a:lumMod val="75000"/>
-                    <a:lumOff val="25000"/>
-                  </a:schemeClr>
-                </a:solidFill>
-                <a:latin typeface="Franklin Gothic Demi" panose="020B0703020102020204" pitchFamily="34" charset="0"/>
-              </a:rPr>
-              <a:t>ER SCHEMA</a:t>
-            </a:r>
-          </a:p>
-        </p:txBody>
-      </p:sp>
-      <p:pic>
-        <p:nvPicPr>
-          <p:cNvPr id="5" name="Immagine 4">
-            <a:extLst>
-              <a:ext uri="{FF2B5EF4-FFF2-40B4-BE49-F238E27FC236}">
-                <a16:creationId xmlns:a16="http://schemas.microsoft.com/office/drawing/2014/main" id="{7A267238-B9FE-43B9-A6ED-2CB88D5B05E9}"/>
-              </a:ext>
-            </a:extLst>
-          </p:cNvPr>
-          <p:cNvPicPr>
-            <a:picLocks noChangeAspect="1"/>
-          </p:cNvPicPr>
-          <p:nvPr/>
-        </p:nvPicPr>
-        <p:blipFill>
-          <a:blip r:embed="rId2">
-            <a:extLst>
-              <a:ext uri="{28A0092B-C50C-407E-A947-70E740481C1C}">
-                <a14:useLocalDpi xmlns:a14="http://schemas.microsoft.com/office/drawing/2010/main" val="0"/>
-              </a:ext>
-            </a:extLst>
-          </a:blip>
-          <a:stretch>
-            <a:fillRect/>
-          </a:stretch>
-        </p:blipFill>
-        <p:spPr>
-          <a:xfrm>
-            <a:off x="973475" y="1754439"/>
-            <a:ext cx="5122525" cy="4611550"/>
-          </a:xfrm>
-          <a:prstGeom prst="rect">
-            <a:avLst/>
-          </a:prstGeom>
-        </p:spPr>
-      </p:pic>
-      <p:sp>
-        <p:nvSpPr>
-          <p:cNvPr id="6" name="Cornice 5">
-            <a:extLst>
-              <a:ext uri="{FF2B5EF4-FFF2-40B4-BE49-F238E27FC236}">
-                <a16:creationId xmlns:a16="http://schemas.microsoft.com/office/drawing/2014/main" id="{F4F44CE4-5323-46CE-BFF8-4CD13DBAEE82}"/>
+          <p:cNvPr id="2" name="Segno di addizione 1">
+            <a:extLst>
+              <a:ext uri="{FF2B5EF4-FFF2-40B4-BE49-F238E27FC236}">
+                <a16:creationId xmlns:a16="http://schemas.microsoft.com/office/drawing/2014/main" id="{FC479290-017A-46B7-9DF5-0A3A36E7E0FE}"/>
               </a:ext>
             </a:extLst>
           </p:cNvPr>
@@ -5028,12 +4988,12 @@
         </p:nvSpPr>
         <p:spPr>
           <a:xfrm>
-            <a:off x="11244469" y="106017"/>
-            <a:ext cx="728870" cy="717297"/>
-          </a:xfrm>
-          <a:prstGeom prst="frame">
+            <a:off x="11084783" y="20388"/>
+            <a:ext cx="888556" cy="888556"/>
+          </a:xfrm>
+          <a:prstGeom prst="mathPlus">
             <a:avLst>
-              <a:gd name="adj1" fmla="val 19890"/>
+              <a:gd name="adj1" fmla="val 18156"/>
             </a:avLst>
           </a:prstGeom>
           <a:solidFill>
@@ -5064,47 +5024,265 @@
           <a:lstStyle/>
           <a:p>
             <a:pPr algn="ctr"/>
-            <a:endParaRPr lang="it-IT">
-              <a:solidFill>
-                <a:schemeClr val="tx1"/>
-              </a:solidFill>
-            </a:endParaRPr>
-          </a:p>
-        </p:txBody>
-      </p:sp>
-      <p:pic>
-        <p:nvPicPr>
-          <p:cNvPr id="9" name="Immagine 8" descr="Immagine che contiene screenshot, interni, monitor, portatile&#10;&#10;Descrizione generata automaticamente">
-            <a:extLst>
-              <a:ext uri="{FF2B5EF4-FFF2-40B4-BE49-F238E27FC236}">
-                <a16:creationId xmlns:a16="http://schemas.microsoft.com/office/drawing/2014/main" id="{064CE53C-6BAB-4051-A90C-1C1EB14A906E}"/>
-              </a:ext>
-            </a:extLst>
-          </p:cNvPr>
-          <p:cNvPicPr>
-            <a:picLocks noChangeAspect="1"/>
-          </p:cNvPicPr>
+            <a:endParaRPr lang="it-IT"/>
+          </a:p>
+        </p:txBody>
+      </p:sp>
+      <p:sp>
+        <p:nvSpPr>
+          <p:cNvPr id="3" name="CasellaDiTesto 2">
+            <a:extLst>
+              <a:ext uri="{FF2B5EF4-FFF2-40B4-BE49-F238E27FC236}">
+                <a16:creationId xmlns:a16="http://schemas.microsoft.com/office/drawing/2014/main" id="{723CDE17-946A-423A-828D-CF9D21915D40}"/>
+              </a:ext>
+            </a:extLst>
+          </p:cNvPr>
+          <p:cNvSpPr txBox="1"/>
           <p:nvPr/>
-        </p:nvPicPr>
-        <p:blipFill rotWithShape="1">
-          <a:blip r:embed="rId3">
-            <a:extLst>
-              <a:ext uri="{28A0092B-C50C-407E-A947-70E740481C1C}">
-                <a14:useLocalDpi xmlns:a14="http://schemas.microsoft.com/office/drawing/2010/main" val="0"/>
-              </a:ext>
-            </a:extLst>
-          </a:blip>
-          <a:srcRect l="29130" t="46569" r="39565" b="20026"/>
-          <a:stretch/>
-        </p:blipFill>
-        <p:spPr>
-          <a:xfrm>
-            <a:off x="6440556" y="1818218"/>
-            <a:ext cx="5532781" cy="3221563"/>
+        </p:nvSpPr>
+        <p:spPr>
+          <a:xfrm>
+            <a:off x="1354711" y="172278"/>
+            <a:ext cx="4406349" cy="584775"/>
           </a:xfrm>
           <a:prstGeom prst="rect">
             <a:avLst/>
           </a:prstGeom>
+          <a:noFill/>
+        </p:spPr>
+        <p:txBody>
+          <a:bodyPr wrap="square" rtlCol="0">
+            <a:spAutoFit/>
+          </a:bodyPr>
+          <a:lstStyle/>
+          <a:p>
+            <a:pPr algn="ctr"/>
+            <a:r>
+              <a:rPr lang="it-IT" sz="3200" dirty="0">
+                <a:solidFill>
+                  <a:schemeClr val="tx1">
+                    <a:lumMod val="75000"/>
+                    <a:lumOff val="25000"/>
+                  </a:schemeClr>
+                </a:solidFill>
+                <a:latin typeface="Franklin Gothic Demi" panose="020B0703020102020204" pitchFamily="34" charset="0"/>
+              </a:rPr>
+              <a:t>AGGIUNTA DATASET #3</a:t>
+            </a:r>
+          </a:p>
+        </p:txBody>
+      </p:sp>
+      <p:sp>
+        <p:nvSpPr>
+          <p:cNvPr id="4" name="CasellaDiTesto 3">
+            <a:extLst>
+              <a:ext uri="{FF2B5EF4-FFF2-40B4-BE49-F238E27FC236}">
+                <a16:creationId xmlns:a16="http://schemas.microsoft.com/office/drawing/2014/main" id="{D3DC8EF8-AD09-4450-895D-DF0F16E53E4B}"/>
+              </a:ext>
+            </a:extLst>
+          </p:cNvPr>
+          <p:cNvSpPr txBox="1"/>
+          <p:nvPr/>
+        </p:nvSpPr>
+        <p:spPr>
+          <a:xfrm>
+            <a:off x="2746189" y="1389812"/>
+            <a:ext cx="1623392" cy="400110"/>
+          </a:xfrm>
+          <a:prstGeom prst="rect">
+            <a:avLst/>
+          </a:prstGeom>
+          <a:noFill/>
+        </p:spPr>
+        <p:txBody>
+          <a:bodyPr wrap="square" rtlCol="0">
+            <a:spAutoFit/>
+          </a:bodyPr>
+          <a:lstStyle/>
+          <a:p>
+            <a:pPr algn="ctr"/>
+            <a:r>
+              <a:rPr lang="it-IT" sz="2000" dirty="0">
+                <a:solidFill>
+                  <a:srgbClr val="404040"/>
+                </a:solidFill>
+                <a:latin typeface="Franklin Gothic Demi" panose="020B0703020102020204" pitchFamily="34" charset="0"/>
+              </a:rPr>
+              <a:t>VOTE_USER</a:t>
+            </a:r>
+          </a:p>
+        </p:txBody>
+      </p:sp>
+      <p:sp>
+        <p:nvSpPr>
+          <p:cNvPr id="7" name="CasellaDiTesto 6">
+            <a:extLst>
+              <a:ext uri="{FF2B5EF4-FFF2-40B4-BE49-F238E27FC236}">
+                <a16:creationId xmlns:a16="http://schemas.microsoft.com/office/drawing/2014/main" id="{8BFEBC0E-52F1-4C6C-B304-D9D6B21D72F1}"/>
+              </a:ext>
+            </a:extLst>
+          </p:cNvPr>
+          <p:cNvSpPr txBox="1"/>
+          <p:nvPr/>
+        </p:nvSpPr>
+        <p:spPr>
+          <a:xfrm>
+            <a:off x="619215" y="2182772"/>
+            <a:ext cx="5877340" cy="3785652"/>
+          </a:xfrm>
+          <a:prstGeom prst="rect">
+            <a:avLst/>
+          </a:prstGeom>
+          <a:noFill/>
+        </p:spPr>
+        <p:txBody>
+          <a:bodyPr wrap="square" rtlCol="0">
+            <a:spAutoFit/>
+          </a:bodyPr>
+          <a:lstStyle/>
+          <a:p>
+            <a:pPr marL="285750" indent="-285750">
+              <a:buFont typeface="Wingdings" panose="05000000000000000000" pitchFamily="2" charset="2"/>
+              <a:buChar char="§"/>
+            </a:pPr>
+            <a:r>
+              <a:rPr lang="it-IT" sz="2000" dirty="0">
+                <a:latin typeface="Franklin Gothic Book" panose="020B0503020102020204" pitchFamily="34" charset="0"/>
+              </a:rPr>
+              <a:t>Si è aggiunto il dataset </a:t>
+            </a:r>
+            <a:r>
+              <a:rPr lang="it-IT" sz="2000" dirty="0" err="1">
+                <a:latin typeface="Franklin Gothic Book" panose="020B0503020102020204" pitchFamily="34" charset="0"/>
+              </a:rPr>
+              <a:t>vote_user_dataset</a:t>
+            </a:r>
+            <a:r>
+              <a:rPr lang="it-IT" sz="2000" dirty="0">
+                <a:latin typeface="Franklin Gothic Book" panose="020B0503020102020204" pitchFamily="34" charset="0"/>
+              </a:rPr>
+              <a:t> nel bucket S3.</a:t>
+            </a:r>
+          </a:p>
+          <a:p>
+            <a:pPr marL="285750" indent="-285750">
+              <a:buFont typeface="Wingdings" panose="05000000000000000000" pitchFamily="2" charset="2"/>
+              <a:buChar char="§"/>
+            </a:pPr>
+            <a:r>
+              <a:rPr lang="it-IT" sz="2000" dirty="0">
+                <a:latin typeface="Franklin Gothic Book" panose="020B0503020102020204" pitchFamily="34" charset="0"/>
+              </a:rPr>
+              <a:t>Si è modificato lo script del processo contenuto in AWS </a:t>
+            </a:r>
+            <a:r>
+              <a:rPr lang="it-IT" sz="2000" dirty="0" err="1">
+                <a:latin typeface="Franklin Gothic Book" panose="020B0503020102020204" pitchFamily="34" charset="0"/>
+              </a:rPr>
+              <a:t>Glue</a:t>
+            </a:r>
+            <a:r>
+              <a:rPr lang="it-IT" sz="2000" dirty="0">
+                <a:latin typeface="Franklin Gothic Book" panose="020B0503020102020204" pitchFamily="34" charset="0"/>
+              </a:rPr>
+              <a:t>.</a:t>
+            </a:r>
+          </a:p>
+          <a:p>
+            <a:pPr marL="1200150" lvl="2" indent="-285750">
+              <a:buFont typeface="Wingdings" panose="05000000000000000000" pitchFamily="2" charset="2"/>
+              <a:buChar char="§"/>
+            </a:pPr>
+            <a:r>
+              <a:rPr lang="it-IT" sz="2000" dirty="0">
+                <a:latin typeface="Franklin Gothic Book" panose="020B0503020102020204" pitchFamily="34" charset="0"/>
+              </a:rPr>
+              <a:t>Si è aggiunto il dataset, indicandone il </a:t>
+            </a:r>
+            <a:r>
+              <a:rPr lang="it-IT" sz="2000" dirty="0" err="1">
+                <a:latin typeface="Franklin Gothic Book" panose="020B0503020102020204" pitchFamily="34" charset="0"/>
+              </a:rPr>
+              <a:t>path</a:t>
+            </a:r>
+            <a:r>
+              <a:rPr lang="it-IT" sz="2000" dirty="0">
+                <a:latin typeface="Franklin Gothic Book" panose="020B0503020102020204" pitchFamily="34" charset="0"/>
+              </a:rPr>
+              <a:t>.</a:t>
+            </a:r>
+          </a:p>
+          <a:p>
+            <a:pPr marL="1200150" lvl="2" indent="-285750">
+              <a:buFont typeface="Wingdings" panose="05000000000000000000" pitchFamily="2" charset="2"/>
+              <a:buChar char="§"/>
+            </a:pPr>
+            <a:r>
+              <a:rPr lang="it-IT" sz="2000" dirty="0">
+                <a:latin typeface="Franklin Gothic Book" panose="020B0503020102020204" pitchFamily="34" charset="0"/>
+              </a:rPr>
+              <a:t>Abbiamo raggruppato i voti per ID del Talk.</a:t>
+            </a:r>
+          </a:p>
+          <a:p>
+            <a:pPr marL="1200150" lvl="2" indent="-285750">
+              <a:buFont typeface="Wingdings" panose="05000000000000000000" pitchFamily="2" charset="2"/>
+              <a:buChar char="§"/>
+            </a:pPr>
+            <a:r>
+              <a:rPr lang="it-IT" sz="2000" dirty="0">
+                <a:latin typeface="Franklin Gothic Book" panose="020B0503020102020204" pitchFamily="34" charset="0"/>
+              </a:rPr>
+              <a:t>Inoltre abbiamo creato una struttura per la visualizzazione dei voti.</a:t>
+            </a:r>
+          </a:p>
+          <a:p>
+            <a:pPr marL="1200150" lvl="2" indent="-285750">
+              <a:buFont typeface="Wingdings" panose="05000000000000000000" pitchFamily="2" charset="2"/>
+              <a:buChar char="§"/>
+            </a:pPr>
+            <a:r>
+              <a:rPr lang="it-IT" sz="2000" dirty="0">
+                <a:latin typeface="Franklin Gothic Book" panose="020B0503020102020204" pitchFamily="34" charset="0"/>
+              </a:rPr>
+              <a:t>Abbiamo effettuato una </a:t>
+            </a:r>
+            <a:r>
+              <a:rPr lang="it-IT" sz="2000" dirty="0" err="1">
+                <a:latin typeface="Franklin Gothic Book" panose="020B0503020102020204" pitchFamily="34" charset="0"/>
+              </a:rPr>
+              <a:t>left</a:t>
+            </a:r>
+            <a:r>
+              <a:rPr lang="it-IT" sz="2000" dirty="0">
+                <a:latin typeface="Franklin Gothic Book" panose="020B0503020102020204" pitchFamily="34" charset="0"/>
+              </a:rPr>
+              <a:t> join con il dataset principale.</a:t>
+            </a:r>
+          </a:p>
+        </p:txBody>
+      </p:sp>
+      <p:sp>
+        <p:nvSpPr>
+          <p:cNvPr id="9" name="CasellaDiTesto 8">
+            <a:extLst>
+              <a:ext uri="{FF2B5EF4-FFF2-40B4-BE49-F238E27FC236}">
+                <a16:creationId xmlns:a16="http://schemas.microsoft.com/office/drawing/2014/main" id="{DCE61888-07E9-4EA3-9B3B-24F4166A9948}"/>
+              </a:ext>
+            </a:extLst>
+          </p:cNvPr>
+          <p:cNvSpPr txBox="1"/>
+          <p:nvPr/>
+        </p:nvSpPr>
+        <p:spPr>
+          <a:xfrm>
+            <a:off x="6897111" y="2328843"/>
+            <a:ext cx="5042452" cy="3323987"/>
+          </a:xfrm>
+          <a:prstGeom prst="rect">
+            <a:avLst/>
+          </a:prstGeom>
+          <a:noFill/>
           <a:ln w="57150">
             <a:solidFill>
               <a:srgbClr val="00CC99"/>
@@ -5112,56 +5290,159 @@
             <a:prstDash val="dash"/>
           </a:ln>
         </p:spPr>
-      </p:pic>
-      <p:sp>
-        <p:nvSpPr>
-          <p:cNvPr id="12" name="CasellaDiTesto 11">
-            <a:extLst>
-              <a:ext uri="{FF2B5EF4-FFF2-40B4-BE49-F238E27FC236}">
-                <a16:creationId xmlns:a16="http://schemas.microsoft.com/office/drawing/2014/main" id="{742AED35-325C-48D4-B396-9D8FCB7F26C0}"/>
-              </a:ext>
-            </a:extLst>
-          </p:cNvPr>
-          <p:cNvSpPr txBox="1"/>
-          <p:nvPr/>
-        </p:nvSpPr>
-        <p:spPr>
-          <a:xfrm>
-            <a:off x="7444408" y="1187005"/>
-            <a:ext cx="3525079" cy="369332"/>
-          </a:xfrm>
-          <a:prstGeom prst="rect">
-            <a:avLst/>
-          </a:prstGeom>
-          <a:noFill/>
-        </p:spPr>
         <p:txBody>
           <a:bodyPr wrap="square" rtlCol="0">
             <a:spAutoFit/>
           </a:bodyPr>
           <a:lstStyle/>
           <a:p>
-            <a:pPr algn="ctr"/>
-            <a:r>
-              <a:rPr lang="it-IT" dirty="0" err="1">
-                <a:latin typeface="Franklin Gothic Demi" panose="020B0703020102020204" pitchFamily="34" charset="0"/>
-              </a:rPr>
-              <a:t>MongoDB</a:t>
-            </a:r>
-            <a:r>
-              <a:rPr lang="it-IT" dirty="0">
-                <a:latin typeface="Franklin Gothic Demi" panose="020B0703020102020204" pitchFamily="34" charset="0"/>
-              </a:rPr>
-              <a:t> </a:t>
-            </a:r>
-            <a:r>
-              <a:rPr lang="it-IT" dirty="0" err="1">
-                <a:latin typeface="Franklin Gothic Demi" panose="020B0703020102020204" pitchFamily="34" charset="0"/>
-              </a:rPr>
-              <a:t>Example</a:t>
-            </a:r>
-            <a:endParaRPr lang="it-IT" dirty="0">
-              <a:latin typeface="Franklin Gothic Demi" panose="020B0703020102020204" pitchFamily="34" charset="0"/>
+            <a:endParaRPr lang="it-IT" sz="1400" dirty="0">
+              <a:latin typeface="Consolas" panose="020B0609020204030204" pitchFamily="49" charset="0"/>
+            </a:endParaRPr>
+          </a:p>
+          <a:p>
+            <a:endParaRPr lang="it-IT" sz="1400" dirty="0">
+              <a:latin typeface="Consolas" panose="020B0609020204030204" pitchFamily="49" charset="0"/>
+            </a:endParaRPr>
+          </a:p>
+          <a:p>
+            <a:endParaRPr lang="it-IT" sz="1400" dirty="0">
+              <a:latin typeface="Consolas" panose="020B0609020204030204" pitchFamily="49" charset="0"/>
+            </a:endParaRPr>
+          </a:p>
+          <a:p>
+            <a:r>
+              <a:rPr lang="en-US" sz="1400" dirty="0">
+                <a:latin typeface="Consolas" panose="020B0609020204030204" pitchFamily="49" charset="0"/>
+              </a:rPr>
+              <a:t>vote_dataset_agg4 = </a:t>
+            </a:r>
+            <a:r>
+              <a:rPr lang="en-US" sz="1400" dirty="0" err="1">
+                <a:latin typeface="Consolas" panose="020B0609020204030204" pitchFamily="49" charset="0"/>
+              </a:rPr>
+              <a:t>vote_dataset.groupBy</a:t>
+            </a:r>
+            <a:r>
+              <a:rPr lang="en-US" sz="1400" dirty="0">
+                <a:latin typeface="Consolas" panose="020B0609020204030204" pitchFamily="49" charset="0"/>
+              </a:rPr>
+              <a:t>(col("</a:t>
+            </a:r>
+            <a:r>
+              <a:rPr lang="en-US" sz="1400" dirty="0" err="1">
+                <a:latin typeface="Consolas" panose="020B0609020204030204" pitchFamily="49" charset="0"/>
+              </a:rPr>
+              <a:t>idx_tedx</a:t>
+            </a:r>
+            <a:r>
+              <a:rPr lang="en-US" sz="1400" dirty="0">
+                <a:latin typeface="Consolas" panose="020B0609020204030204" pitchFamily="49" charset="0"/>
+              </a:rPr>
+              <a:t>")).</a:t>
+            </a:r>
+            <a:r>
+              <a:rPr lang="en-US" sz="1400" dirty="0" err="1">
+                <a:latin typeface="Consolas" panose="020B0609020204030204" pitchFamily="49" charset="0"/>
+              </a:rPr>
+              <a:t>agg</a:t>
+            </a:r>
+            <a:r>
+              <a:rPr lang="en-US" sz="1400" dirty="0">
+                <a:latin typeface="Consolas" panose="020B0609020204030204" pitchFamily="49" charset="0"/>
+              </a:rPr>
+              <a:t>(</a:t>
+            </a:r>
+            <a:r>
+              <a:rPr lang="en-US" sz="1400" dirty="0" err="1">
+                <a:latin typeface="Consolas" panose="020B0609020204030204" pitchFamily="49" charset="0"/>
+              </a:rPr>
+              <a:t>collect_list</a:t>
+            </a:r>
+            <a:r>
+              <a:rPr lang="en-US" sz="1400" dirty="0">
+                <a:latin typeface="Consolas" panose="020B0609020204030204" pitchFamily="49" charset="0"/>
+              </a:rPr>
+              <a:t>(struct(col("date"),col("time"),col("</a:t>
+            </a:r>
+            <a:r>
+              <a:rPr lang="en-US" sz="1400" dirty="0" err="1">
+                <a:latin typeface="Consolas" panose="020B0609020204030204" pitchFamily="49" charset="0"/>
+              </a:rPr>
+              <a:t>mail_user</a:t>
+            </a:r>
+            <a:r>
+              <a:rPr lang="en-US" sz="1400" dirty="0">
+                <a:latin typeface="Consolas" panose="020B0609020204030204" pitchFamily="49" charset="0"/>
+              </a:rPr>
+              <a:t>"),col("vote"))).alias("</a:t>
+            </a:r>
+            <a:r>
+              <a:rPr lang="en-US" sz="1400" dirty="0" err="1">
+                <a:latin typeface="Consolas" panose="020B0609020204030204" pitchFamily="49" charset="0"/>
+              </a:rPr>
+              <a:t>vote_user</a:t>
+            </a:r>
+            <a:r>
+              <a:rPr lang="en-US" sz="1400" dirty="0">
+                <a:latin typeface="Consolas" panose="020B0609020204030204" pitchFamily="49" charset="0"/>
+              </a:rPr>
+              <a:t>"))</a:t>
+            </a:r>
+          </a:p>
+          <a:p>
+            <a:endParaRPr lang="en-US" sz="1400" dirty="0">
+              <a:latin typeface="Consolas" panose="020B0609020204030204" pitchFamily="49" charset="0"/>
+            </a:endParaRPr>
+          </a:p>
+          <a:p>
+            <a:r>
+              <a:rPr lang="it-IT" sz="1400" dirty="0">
+                <a:latin typeface="Consolas" panose="020B0609020204030204" pitchFamily="49" charset="0"/>
+              </a:rPr>
+              <a:t>tedx_dataset_agg4 = tedx_dataset_agg3.join(vote_dataset_agg4, tedx_dataset_agg3._id == vote_dataset_agg4.idx_tedx, "</a:t>
+            </a:r>
+            <a:r>
+              <a:rPr lang="it-IT" sz="1400" dirty="0" err="1">
+                <a:latin typeface="Consolas" panose="020B0609020204030204" pitchFamily="49" charset="0"/>
+              </a:rPr>
+              <a:t>left</a:t>
+            </a:r>
+            <a:r>
+              <a:rPr lang="it-IT" sz="1400" dirty="0">
+                <a:latin typeface="Consolas" panose="020B0609020204030204" pitchFamily="49" charset="0"/>
+              </a:rPr>
+              <a:t>") \</a:t>
+            </a:r>
+          </a:p>
+          <a:p>
+            <a:r>
+              <a:rPr lang="it-IT" sz="1400" dirty="0">
+                <a:latin typeface="Consolas" panose="020B0609020204030204" pitchFamily="49" charset="0"/>
+              </a:rPr>
+              <a:t>    .drop("</a:t>
+            </a:r>
+            <a:r>
+              <a:rPr lang="it-IT" sz="1400" dirty="0" err="1">
+                <a:latin typeface="Consolas" panose="020B0609020204030204" pitchFamily="49" charset="0"/>
+              </a:rPr>
+              <a:t>idx_tedx</a:t>
+            </a:r>
+            <a:r>
+              <a:rPr lang="it-IT" sz="1400" dirty="0">
+                <a:latin typeface="Consolas" panose="020B0609020204030204" pitchFamily="49" charset="0"/>
+              </a:rPr>
+              <a:t>")</a:t>
+            </a:r>
+          </a:p>
+          <a:p>
+            <a:endParaRPr lang="it-IT" sz="1400" dirty="0">
+              <a:latin typeface="Consolas" panose="020B0609020204030204" pitchFamily="49" charset="0"/>
+            </a:endParaRPr>
+          </a:p>
+          <a:p>
+            <a:endParaRPr lang="it-IT" sz="1400" dirty="0">
+              <a:latin typeface="Consolas" panose="020B0609020204030204" pitchFamily="49" charset="0"/>
             </a:endParaRPr>
           </a:p>
         </p:txBody>
@@ -5169,7 +5450,7 @@
     </p:spTree>
     <p:extLst>
       <p:ext uri="{BB962C8B-B14F-4D97-AF65-F5344CB8AC3E}">
-        <p14:creationId xmlns:p14="http://schemas.microsoft.com/office/powerpoint/2010/main" val="1346736892"/>
+        <p14:creationId xmlns:p14="http://schemas.microsoft.com/office/powerpoint/2010/main" val="3622743772"/>
       </p:ext>
     </p:extLst>
   </p:cSld>
@@ -5263,7 +5544,7 @@
         <p:spPr>
           <a:xfrm>
             <a:off x="218661" y="889576"/>
-            <a:ext cx="4208195" cy="107386"/>
+            <a:ext cx="6221896" cy="107386"/>
           </a:xfrm>
           <a:prstGeom prst="rect">
             <a:avLst/>
@@ -5314,7 +5595,7 @@
         </p:nvSpPr>
         <p:spPr>
           <a:xfrm>
-            <a:off x="218660" y="172279"/>
+            <a:off x="1225511" y="211613"/>
             <a:ext cx="4208195" cy="584775"/>
           </a:xfrm>
           <a:prstGeom prst="rect">
@@ -5339,17 +5620,75 @@
                 </a:solidFill>
                 <a:latin typeface="Franklin Gothic Demi" panose="020B0703020102020204" pitchFamily="34" charset="0"/>
               </a:rPr>
-              <a:t>USO DEI DATI</a:t>
-            </a:r>
-          </a:p>
-        </p:txBody>
-      </p:sp>
-      <p:sp>
-        <p:nvSpPr>
-          <p:cNvPr id="5" name="CasellaDiTesto 4">
-            <a:extLst>
-              <a:ext uri="{FF2B5EF4-FFF2-40B4-BE49-F238E27FC236}">
-                <a16:creationId xmlns:a16="http://schemas.microsoft.com/office/drawing/2014/main" id="{1C1A597C-B17A-42D8-B8E4-F1835DFCBDBB}"/>
+              <a:t>ER SCHEMA</a:t>
+            </a:r>
+          </a:p>
+        </p:txBody>
+      </p:sp>
+      <p:sp>
+        <p:nvSpPr>
+          <p:cNvPr id="6" name="Cornice 5">
+            <a:extLst>
+              <a:ext uri="{FF2B5EF4-FFF2-40B4-BE49-F238E27FC236}">
+                <a16:creationId xmlns:a16="http://schemas.microsoft.com/office/drawing/2014/main" id="{F4F44CE4-5323-46CE-BFF8-4CD13DBAEE82}"/>
+              </a:ext>
+            </a:extLst>
+          </p:cNvPr>
+          <p:cNvSpPr/>
+          <p:nvPr/>
+        </p:nvSpPr>
+        <p:spPr>
+          <a:xfrm>
+            <a:off x="11244469" y="106017"/>
+            <a:ext cx="728870" cy="717297"/>
+          </a:xfrm>
+          <a:prstGeom prst="frame">
+            <a:avLst>
+              <a:gd name="adj1" fmla="val 19890"/>
+            </a:avLst>
+          </a:prstGeom>
+          <a:solidFill>
+            <a:srgbClr val="FF5050"/>
+          </a:solidFill>
+          <a:ln>
+            <a:noFill/>
+          </a:ln>
+        </p:spPr>
+        <p:style>
+          <a:lnRef idx="2">
+            <a:schemeClr val="accent1">
+              <a:shade val="50000"/>
+            </a:schemeClr>
+          </a:lnRef>
+          <a:fillRef idx="1">
+            <a:schemeClr val="accent1"/>
+          </a:fillRef>
+          <a:effectRef idx="0">
+            <a:schemeClr val="accent1"/>
+          </a:effectRef>
+          <a:fontRef idx="minor">
+            <a:schemeClr val="lt1"/>
+          </a:fontRef>
+        </p:style>
+        <p:txBody>
+          <a:bodyPr rtlCol="0" anchor="ctr"/>
+          <a:lstStyle/>
+          <a:p>
+            <a:pPr algn="ctr"/>
+            <a:endParaRPr lang="it-IT">
+              <a:solidFill>
+                <a:schemeClr val="tx1"/>
+              </a:solidFill>
+            </a:endParaRPr>
+          </a:p>
+        </p:txBody>
+      </p:sp>
+      <p:sp>
+        <p:nvSpPr>
+          <p:cNvPr id="12" name="CasellaDiTesto 11">
+            <a:extLst>
+              <a:ext uri="{FF2B5EF4-FFF2-40B4-BE49-F238E27FC236}">
+                <a16:creationId xmlns:a16="http://schemas.microsoft.com/office/drawing/2014/main" id="{742AED35-325C-48D4-B396-9D8FCB7F26C0}"/>
               </a:ext>
             </a:extLst>
           </p:cNvPr>
@@ -5358,8 +5697,8 @@
         </p:nvSpPr>
         <p:spPr>
           <a:xfrm>
-            <a:off x="11005929" y="-5197"/>
-            <a:ext cx="967409" cy="923330"/>
+            <a:off x="7444408" y="1187005"/>
+            <a:ext cx="3525079" cy="369332"/>
           </a:xfrm>
           <a:prstGeom prst="rect">
             <a:avLst/>
@@ -5374,191 +5713,110 @@
           <a:p>
             <a:pPr algn="ctr"/>
             <a:r>
-              <a:rPr lang="it-IT" sz="5400" dirty="0">
-                <a:solidFill>
-                  <a:srgbClr val="FF5050"/>
-                </a:solidFill>
+              <a:rPr lang="it-IT" dirty="0" err="1">
                 <a:latin typeface="Franklin Gothic Demi" panose="020B0703020102020204" pitchFamily="34" charset="0"/>
               </a:rPr>
-              <a:t>?</a:t>
-            </a:r>
-            <a:endParaRPr lang="it-IT" sz="4800" dirty="0">
-              <a:solidFill>
-                <a:srgbClr val="FF5050"/>
-              </a:solidFill>
+              <a:t>MongoDB</a:t>
+            </a:r>
+            <a:r>
+              <a:rPr lang="it-IT" dirty="0">
+                <a:latin typeface="Franklin Gothic Demi" panose="020B0703020102020204" pitchFamily="34" charset="0"/>
+              </a:rPr>
+              <a:t> </a:t>
+            </a:r>
+            <a:r>
+              <a:rPr lang="it-IT" dirty="0" err="1">
+                <a:latin typeface="Franklin Gothic Demi" panose="020B0703020102020204" pitchFamily="34" charset="0"/>
+              </a:rPr>
+              <a:t>Example</a:t>
+            </a:r>
+            <a:endParaRPr lang="it-IT" dirty="0">
               <a:latin typeface="Franklin Gothic Demi" panose="020B0703020102020204" pitchFamily="34" charset="0"/>
             </a:endParaRPr>
           </a:p>
         </p:txBody>
       </p:sp>
-      <p:sp>
-        <p:nvSpPr>
-          <p:cNvPr id="6" name="CasellaDiTesto 5">
-            <a:extLst>
-              <a:ext uri="{FF2B5EF4-FFF2-40B4-BE49-F238E27FC236}">
-                <a16:creationId xmlns:a16="http://schemas.microsoft.com/office/drawing/2014/main" id="{81DC5320-074F-4BFB-BCD8-63249C5818E7}"/>
-              </a:ext>
-            </a:extLst>
-          </p:cNvPr>
-          <p:cNvSpPr txBox="1"/>
+      <p:pic>
+        <p:nvPicPr>
+          <p:cNvPr id="4" name="Immagine 3" descr="Immagine che contiene testo, mappa&#10;&#10;Descrizione generata automaticamente">
+            <a:extLst>
+              <a:ext uri="{FF2B5EF4-FFF2-40B4-BE49-F238E27FC236}">
+                <a16:creationId xmlns:a16="http://schemas.microsoft.com/office/drawing/2014/main" id="{0A5C9B5C-7962-484A-B639-D9434AFB5BBA}"/>
+              </a:ext>
+            </a:extLst>
+          </p:cNvPr>
+          <p:cNvPicPr>
+            <a:picLocks noChangeAspect="1"/>
+          </p:cNvPicPr>
           <p:nvPr/>
-        </p:nvSpPr>
-        <p:spPr>
-          <a:xfrm>
-            <a:off x="218661" y="1891735"/>
-            <a:ext cx="4208195" cy="400110"/>
+        </p:nvPicPr>
+        <p:blipFill>
+          <a:blip r:embed="rId2">
+            <a:extLst>
+              <a:ext uri="{28A0092B-C50C-407E-A947-70E740481C1C}">
+                <a14:useLocalDpi xmlns:a14="http://schemas.microsoft.com/office/drawing/2010/main" val="0"/>
+              </a:ext>
+            </a:extLst>
+          </a:blip>
+          <a:stretch>
+            <a:fillRect/>
+          </a:stretch>
+        </p:blipFill>
+        <p:spPr>
+          <a:xfrm>
+            <a:off x="657845" y="2529899"/>
+            <a:ext cx="5343525" cy="3438525"/>
           </a:xfrm>
           <a:prstGeom prst="rect">
             <a:avLst/>
           </a:prstGeom>
-          <a:noFill/>
-        </p:spPr>
-        <p:txBody>
-          <a:bodyPr wrap="square" rtlCol="0">
-            <a:spAutoFit/>
-          </a:bodyPr>
-          <a:lstStyle/>
-          <a:p>
-            <a:pPr algn="ctr"/>
-            <a:r>
-              <a:rPr lang="it-IT" sz="2000" dirty="0">
-                <a:latin typeface="Franklin Gothic Demi" panose="020B0703020102020204" pitchFamily="34" charset="0"/>
-              </a:rPr>
-              <a:t>WATCH_NEXT</a:t>
-            </a:r>
-          </a:p>
-        </p:txBody>
-      </p:sp>
-      <p:sp>
-        <p:nvSpPr>
-          <p:cNvPr id="7" name="CasellaDiTesto 6">
-            <a:extLst>
-              <a:ext uri="{FF2B5EF4-FFF2-40B4-BE49-F238E27FC236}">
-                <a16:creationId xmlns:a16="http://schemas.microsoft.com/office/drawing/2014/main" id="{49AE636A-6D5F-4EBB-B1A7-74166A0F6EB9}"/>
-              </a:ext>
-            </a:extLst>
-          </p:cNvPr>
-          <p:cNvSpPr txBox="1"/>
+        </p:spPr>
+      </p:pic>
+      <p:pic>
+        <p:nvPicPr>
+          <p:cNvPr id="10" name="Immagine 9" descr="Immagine che contiene screenshot&#10;&#10;Descrizione generata automaticamente">
+            <a:extLst>
+              <a:ext uri="{FF2B5EF4-FFF2-40B4-BE49-F238E27FC236}">
+                <a16:creationId xmlns:a16="http://schemas.microsoft.com/office/drawing/2014/main" id="{34D99843-8F8D-452C-93AC-14665338B788}"/>
+              </a:ext>
+            </a:extLst>
+          </p:cNvPr>
+          <p:cNvPicPr>
+            <a:picLocks noChangeAspect="1"/>
+          </p:cNvPicPr>
           <p:nvPr/>
-        </p:nvSpPr>
-        <p:spPr>
-          <a:xfrm>
-            <a:off x="4426856" y="1891735"/>
-            <a:ext cx="7546483" cy="400110"/>
+        </p:nvPicPr>
+        <p:blipFill rotWithShape="1">
+          <a:blip r:embed="rId3">
+            <a:extLst>
+              <a:ext uri="{28A0092B-C50C-407E-A947-70E740481C1C}">
+                <a14:useLocalDpi xmlns:a14="http://schemas.microsoft.com/office/drawing/2010/main" val="0"/>
+              </a:ext>
+            </a:extLst>
+          </a:blip>
+          <a:srcRect l="35978" t="21256" r="24674" b="9759"/>
+          <a:stretch/>
+        </p:blipFill>
+        <p:spPr>
+          <a:xfrm>
+            <a:off x="6811617" y="1746380"/>
+            <a:ext cx="4797287" cy="4731027"/>
           </a:xfrm>
           <a:prstGeom prst="rect">
             <a:avLst/>
           </a:prstGeom>
-          <a:noFill/>
-        </p:spPr>
-        <p:txBody>
-          <a:bodyPr wrap="square" rtlCol="0">
-            <a:spAutoFit/>
-          </a:bodyPr>
-          <a:lstStyle/>
-          <a:p>
-            <a:r>
-              <a:rPr lang="it-IT" sz="2000" dirty="0"/>
-              <a:t>Guardare i video correlati a quello che si sta guardando.</a:t>
-            </a:r>
-          </a:p>
-        </p:txBody>
-      </p:sp>
-      <p:sp>
-        <p:nvSpPr>
-          <p:cNvPr id="10" name="CasellaDiTesto 9">
-            <a:extLst>
-              <a:ext uri="{FF2B5EF4-FFF2-40B4-BE49-F238E27FC236}">
-                <a16:creationId xmlns:a16="http://schemas.microsoft.com/office/drawing/2014/main" id="{97B08D9D-077B-41D9-95F8-BB48AAFA20F3}"/>
-              </a:ext>
-            </a:extLst>
-          </p:cNvPr>
-          <p:cNvSpPr txBox="1"/>
-          <p:nvPr/>
-        </p:nvSpPr>
-        <p:spPr>
-          <a:xfrm>
-            <a:off x="218660" y="3878710"/>
-            <a:ext cx="4208195" cy="400110"/>
-          </a:xfrm>
-          <a:prstGeom prst="rect">
-            <a:avLst/>
-          </a:prstGeom>
-          <a:noFill/>
-        </p:spPr>
-        <p:txBody>
-          <a:bodyPr wrap="square" rtlCol="0">
-            <a:spAutoFit/>
-          </a:bodyPr>
-          <a:lstStyle/>
-          <a:p>
-            <a:pPr algn="ctr"/>
-            <a:r>
-              <a:rPr lang="it-IT" sz="2000" dirty="0">
-                <a:latin typeface="Franklin Gothic Demi" panose="020B0703020102020204" pitchFamily="34" charset="0"/>
-              </a:rPr>
-              <a:t>GEO_TALK</a:t>
-            </a:r>
-          </a:p>
-        </p:txBody>
-      </p:sp>
-      <p:sp>
-        <p:nvSpPr>
-          <p:cNvPr id="12" name="CasellaDiTesto 11">
-            <a:extLst>
-              <a:ext uri="{FF2B5EF4-FFF2-40B4-BE49-F238E27FC236}">
-                <a16:creationId xmlns:a16="http://schemas.microsoft.com/office/drawing/2014/main" id="{61E9E0E0-DFE5-4AD7-90F6-C7E1BDF18256}"/>
-              </a:ext>
-            </a:extLst>
-          </p:cNvPr>
-          <p:cNvSpPr txBox="1"/>
-          <p:nvPr/>
-        </p:nvSpPr>
-        <p:spPr>
-          <a:xfrm>
-            <a:off x="4426855" y="3878710"/>
-            <a:ext cx="7546484" cy="1631216"/>
-          </a:xfrm>
-          <a:prstGeom prst="rect">
-            <a:avLst/>
-          </a:prstGeom>
-          <a:noFill/>
-        </p:spPr>
-        <p:txBody>
-          <a:bodyPr wrap="square" rtlCol="0">
-            <a:spAutoFit/>
-          </a:bodyPr>
-          <a:lstStyle/>
-          <a:p>
-            <a:r>
-              <a:rPr lang="it-IT" sz="2000" dirty="0"/>
-              <a:t>Fornisce informazioni aggiuntive ai video.</a:t>
-            </a:r>
-          </a:p>
-          <a:p>
-            <a:endParaRPr lang="it-IT" sz="2000" dirty="0"/>
-          </a:p>
-          <a:p>
-            <a:r>
-              <a:rPr lang="it-IT" sz="2000" dirty="0"/>
-              <a:t>Permette di espandere le possibilità di ricerca.</a:t>
-            </a:r>
-          </a:p>
-          <a:p>
-            <a:endParaRPr lang="it-IT" sz="2000" dirty="0"/>
-          </a:p>
-          <a:p>
-            <a:r>
-              <a:rPr lang="it-IT" sz="2000" dirty="0"/>
-              <a:t>Mostra contenuti relativi all’area geografica.</a:t>
-            </a:r>
-          </a:p>
-        </p:txBody>
-      </p:sp>
+          <a:ln w="57150">
+            <a:solidFill>
+              <a:srgbClr val="00CC99"/>
+            </a:solidFill>
+            <a:prstDash val="dash"/>
+          </a:ln>
+        </p:spPr>
+      </p:pic>
     </p:spTree>
     <p:extLst>
       <p:ext uri="{BB962C8B-B14F-4D97-AF65-F5344CB8AC3E}">
-        <p14:creationId xmlns:p14="http://schemas.microsoft.com/office/powerpoint/2010/main" val="3462367110"/>
+        <p14:creationId xmlns:p14="http://schemas.microsoft.com/office/powerpoint/2010/main" val="1346736892"/>
       </p:ext>
     </p:extLst>
   </p:cSld>
@@ -5728,17 +5986,17 @@
                 </a:solidFill>
                 <a:latin typeface="Franklin Gothic Demi" panose="020B0703020102020204" pitchFamily="34" charset="0"/>
               </a:rPr>
-              <a:t>CRITICITÀ TECNICHE</a:t>
-            </a:r>
-          </a:p>
-        </p:txBody>
-      </p:sp>
-      <p:sp>
-        <p:nvSpPr>
-          <p:cNvPr id="4" name="CasellaDiTesto 3">
-            <a:extLst>
-              <a:ext uri="{FF2B5EF4-FFF2-40B4-BE49-F238E27FC236}">
-                <a16:creationId xmlns:a16="http://schemas.microsoft.com/office/drawing/2014/main" id="{203C8D73-B29A-4888-8269-0AD9DBF85695}"/>
+              <a:t>USO DEI DATI</a:t>
+            </a:r>
+          </a:p>
+        </p:txBody>
+      </p:sp>
+      <p:sp>
+        <p:nvSpPr>
+          <p:cNvPr id="5" name="CasellaDiTesto 4">
+            <a:extLst>
+              <a:ext uri="{FF2B5EF4-FFF2-40B4-BE49-F238E27FC236}">
+                <a16:creationId xmlns:a16="http://schemas.microsoft.com/office/drawing/2014/main" id="{1C1A597C-B17A-42D8-B8E4-F1835DFCBDBB}"/>
               </a:ext>
             </a:extLst>
           </p:cNvPr>
@@ -5747,8 +6005,8 @@
         </p:nvSpPr>
         <p:spPr>
           <a:xfrm>
-            <a:off x="1035326" y="1843950"/>
-            <a:ext cx="10121348" cy="3170099"/>
+            <a:off x="11005929" y="-5197"/>
+            <a:ext cx="967409" cy="923330"/>
           </a:xfrm>
           <a:prstGeom prst="rect">
             <a:avLst/>
@@ -5761,118 +6019,284 @@
           </a:bodyPr>
           <a:lstStyle/>
           <a:p>
-            <a:pPr marL="285750" indent="-285750">
-              <a:buFont typeface="Wingdings" panose="05000000000000000000" pitchFamily="2" charset="2"/>
-              <a:buChar char="§"/>
-            </a:pPr>
+            <a:pPr algn="ctr"/>
+            <a:r>
+              <a:rPr lang="it-IT" sz="5400" dirty="0">
+                <a:solidFill>
+                  <a:srgbClr val="FF5050"/>
+                </a:solidFill>
+                <a:latin typeface="Franklin Gothic Demi" panose="020B0703020102020204" pitchFamily="34" charset="0"/>
+              </a:rPr>
+              <a:t>?</a:t>
+            </a:r>
+            <a:endParaRPr lang="it-IT" sz="4800" dirty="0">
+              <a:solidFill>
+                <a:srgbClr val="FF5050"/>
+              </a:solidFill>
+              <a:latin typeface="Franklin Gothic Demi" panose="020B0703020102020204" pitchFamily="34" charset="0"/>
+            </a:endParaRPr>
+          </a:p>
+        </p:txBody>
+      </p:sp>
+      <p:sp>
+        <p:nvSpPr>
+          <p:cNvPr id="6" name="CasellaDiTesto 5">
+            <a:extLst>
+              <a:ext uri="{FF2B5EF4-FFF2-40B4-BE49-F238E27FC236}">
+                <a16:creationId xmlns:a16="http://schemas.microsoft.com/office/drawing/2014/main" id="{81DC5320-074F-4BFB-BCD8-63249C5818E7}"/>
+              </a:ext>
+            </a:extLst>
+          </p:cNvPr>
+          <p:cNvSpPr txBox="1"/>
+          <p:nvPr/>
+        </p:nvSpPr>
+        <p:spPr>
+          <a:xfrm>
+            <a:off x="218657" y="1203530"/>
+            <a:ext cx="4208195" cy="400110"/>
+          </a:xfrm>
+          <a:prstGeom prst="rect">
+            <a:avLst/>
+          </a:prstGeom>
+          <a:noFill/>
+        </p:spPr>
+        <p:txBody>
+          <a:bodyPr wrap="square" rtlCol="0">
+            <a:spAutoFit/>
+          </a:bodyPr>
+          <a:lstStyle/>
+          <a:p>
+            <a:pPr algn="ctr"/>
             <a:r>
               <a:rPr lang="it-IT" sz="2000" dirty="0">
-                <a:latin typeface="Franklin Gothic Book" panose="020B0503020102020204" pitchFamily="34" charset="0"/>
-              </a:rPr>
-              <a:t>L’aggiornamento dei dati relativi alla correlazione dei talk è svolto in maniera manuale.</a:t>
-            </a:r>
-          </a:p>
-          <a:p>
-            <a:endParaRPr lang="it-IT" sz="2000" dirty="0">
-              <a:latin typeface="Franklin Gothic Book" panose="020B0503020102020204" pitchFamily="34" charset="0"/>
-            </a:endParaRPr>
-          </a:p>
-          <a:p>
-            <a:pPr marL="285750" indent="-285750">
-              <a:buFont typeface="Wingdings" panose="05000000000000000000" pitchFamily="2" charset="2"/>
-              <a:buChar char="§"/>
-            </a:pPr>
+                <a:latin typeface="Franklin Gothic Demi" panose="020B0703020102020204" pitchFamily="34" charset="0"/>
+              </a:rPr>
+              <a:t>WATCH_NEXT</a:t>
+            </a:r>
+          </a:p>
+        </p:txBody>
+      </p:sp>
+      <p:sp>
+        <p:nvSpPr>
+          <p:cNvPr id="7" name="CasellaDiTesto 6">
+            <a:extLst>
+              <a:ext uri="{FF2B5EF4-FFF2-40B4-BE49-F238E27FC236}">
+                <a16:creationId xmlns:a16="http://schemas.microsoft.com/office/drawing/2014/main" id="{49AE636A-6D5F-4EBB-B1A7-74166A0F6EB9}"/>
+              </a:ext>
+            </a:extLst>
+          </p:cNvPr>
+          <p:cNvSpPr txBox="1"/>
+          <p:nvPr/>
+        </p:nvSpPr>
+        <p:spPr>
+          <a:xfrm>
+            <a:off x="4426852" y="1203530"/>
+            <a:ext cx="7546483" cy="400110"/>
+          </a:xfrm>
+          <a:prstGeom prst="rect">
+            <a:avLst/>
+          </a:prstGeom>
+          <a:noFill/>
+        </p:spPr>
+        <p:txBody>
+          <a:bodyPr wrap="square" rtlCol="0">
+            <a:spAutoFit/>
+          </a:bodyPr>
+          <a:lstStyle/>
+          <a:p>
+            <a:r>
+              <a:rPr lang="it-IT" sz="2000" dirty="0"/>
+              <a:t>Guardare i video correlati a quello che si sta guardando.</a:t>
+            </a:r>
+          </a:p>
+        </p:txBody>
+      </p:sp>
+      <p:sp>
+        <p:nvSpPr>
+          <p:cNvPr id="10" name="CasellaDiTesto 9">
+            <a:extLst>
+              <a:ext uri="{FF2B5EF4-FFF2-40B4-BE49-F238E27FC236}">
+                <a16:creationId xmlns:a16="http://schemas.microsoft.com/office/drawing/2014/main" id="{97B08D9D-077B-41D9-95F8-BB48AAFA20F3}"/>
+              </a:ext>
+            </a:extLst>
+          </p:cNvPr>
+          <p:cNvSpPr txBox="1"/>
+          <p:nvPr/>
+        </p:nvSpPr>
+        <p:spPr>
+          <a:xfrm>
+            <a:off x="218656" y="2050116"/>
+            <a:ext cx="4208195" cy="400110"/>
+          </a:xfrm>
+          <a:prstGeom prst="rect">
+            <a:avLst/>
+          </a:prstGeom>
+          <a:noFill/>
+        </p:spPr>
+        <p:txBody>
+          <a:bodyPr wrap="square" rtlCol="0">
+            <a:spAutoFit/>
+          </a:bodyPr>
+          <a:lstStyle/>
+          <a:p>
+            <a:pPr algn="ctr"/>
             <a:r>
               <a:rPr lang="it-IT" sz="2000" dirty="0">
-                <a:latin typeface="Franklin Gothic Book" panose="020B0503020102020204" pitchFamily="34" charset="0"/>
-              </a:rPr>
-              <a:t>Un secondo aggiornamento da tenere in considerazione è quello relativo</a:t>
-            </a:r>
-            <a:br>
+                <a:latin typeface="Franklin Gothic Demi" panose="020B0703020102020204" pitchFamily="34" charset="0"/>
+              </a:rPr>
+              <a:t>GEO_TALK</a:t>
+            </a:r>
+          </a:p>
+        </p:txBody>
+      </p:sp>
+      <p:sp>
+        <p:nvSpPr>
+          <p:cNvPr id="12" name="CasellaDiTesto 11">
+            <a:extLst>
+              <a:ext uri="{FF2B5EF4-FFF2-40B4-BE49-F238E27FC236}">
+                <a16:creationId xmlns:a16="http://schemas.microsoft.com/office/drawing/2014/main" id="{61E9E0E0-DFE5-4AD7-90F6-C7E1BDF18256}"/>
+              </a:ext>
+            </a:extLst>
+          </p:cNvPr>
+          <p:cNvSpPr txBox="1"/>
+          <p:nvPr/>
+        </p:nvSpPr>
+        <p:spPr>
+          <a:xfrm>
+            <a:off x="4426851" y="2050116"/>
+            <a:ext cx="7546484" cy="1631216"/>
+          </a:xfrm>
+          <a:prstGeom prst="rect">
+            <a:avLst/>
+          </a:prstGeom>
+          <a:noFill/>
+        </p:spPr>
+        <p:txBody>
+          <a:bodyPr wrap="square" rtlCol="0">
+            <a:spAutoFit/>
+          </a:bodyPr>
+          <a:lstStyle/>
+          <a:p>
+            <a:r>
+              <a:rPr lang="it-IT" sz="2000" dirty="0"/>
+              <a:t>Fornisce informazioni aggiuntive ai video.</a:t>
+            </a:r>
+          </a:p>
+          <a:p>
+            <a:endParaRPr lang="it-IT" sz="2000" dirty="0"/>
+          </a:p>
+          <a:p>
+            <a:r>
+              <a:rPr lang="it-IT" sz="2000" dirty="0"/>
+              <a:t>Permette di espandere le possibilità di ricerca.</a:t>
+            </a:r>
+          </a:p>
+          <a:p>
+            <a:endParaRPr lang="it-IT" sz="2000" dirty="0"/>
+          </a:p>
+          <a:p>
+            <a:r>
+              <a:rPr lang="it-IT" sz="2000" dirty="0"/>
+              <a:t>Mostra contenuti relativi all’area geografica.</a:t>
+            </a:r>
+          </a:p>
+        </p:txBody>
+      </p:sp>
+      <p:sp>
+        <p:nvSpPr>
+          <p:cNvPr id="13" name="CasellaDiTesto 12">
+            <a:extLst>
+              <a:ext uri="{FF2B5EF4-FFF2-40B4-BE49-F238E27FC236}">
+                <a16:creationId xmlns:a16="http://schemas.microsoft.com/office/drawing/2014/main" id="{4DC446EB-FE23-4A0A-8D8A-6E3A5D32F78C}"/>
+              </a:ext>
+            </a:extLst>
+          </p:cNvPr>
+          <p:cNvSpPr txBox="1"/>
+          <p:nvPr/>
+        </p:nvSpPr>
+        <p:spPr>
+          <a:xfrm>
+            <a:off x="218654" y="4127808"/>
+            <a:ext cx="4208195" cy="400110"/>
+          </a:xfrm>
+          <a:prstGeom prst="rect">
+            <a:avLst/>
+          </a:prstGeom>
+          <a:noFill/>
+        </p:spPr>
+        <p:txBody>
+          <a:bodyPr wrap="square" rtlCol="0">
+            <a:spAutoFit/>
+          </a:bodyPr>
+          <a:lstStyle/>
+          <a:p>
+            <a:pPr algn="ctr"/>
+            <a:r>
               <a:rPr lang="it-IT" sz="2000" dirty="0">
-                <a:latin typeface="Franklin Gothic Book" panose="020B0503020102020204" pitchFamily="34" charset="0"/>
-              </a:rPr>
-            </a:br>
-            <a:r>
-              <a:rPr lang="it-IT" sz="2000" dirty="0">
-                <a:latin typeface="Franklin Gothic Book" panose="020B0503020102020204" pitchFamily="34" charset="0"/>
-              </a:rPr>
-              <a:t>all’area geografica, siccome sono dati aggiuntivi.</a:t>
-            </a:r>
-            <a:br>
-              <a:rPr lang="it-IT" sz="2000" dirty="0">
-                <a:latin typeface="Franklin Gothic Book" panose="020B0503020102020204" pitchFamily="34" charset="0"/>
-              </a:rPr>
-            </a:br>
-            <a:r>
-              <a:rPr lang="it-IT" sz="2000" dirty="0">
-                <a:latin typeface="Franklin Gothic Book" panose="020B0503020102020204" pitchFamily="34" charset="0"/>
-              </a:rPr>
-              <a:t>Anche in questo caso, l’aggiornamento risulta statico.</a:t>
-            </a:r>
-          </a:p>
-          <a:p>
-            <a:pPr marL="285750" indent="-285750">
-              <a:buFont typeface="Wingdings" panose="05000000000000000000" pitchFamily="2" charset="2"/>
-              <a:buChar char="§"/>
-            </a:pPr>
-            <a:endParaRPr lang="it-IT" sz="2000" dirty="0">
-              <a:latin typeface="Franklin Gothic Book" panose="020B0503020102020204" pitchFamily="34" charset="0"/>
-            </a:endParaRPr>
-          </a:p>
-          <a:p>
-            <a:pPr marL="285750" indent="-285750">
-              <a:buFont typeface="Wingdings" panose="05000000000000000000" pitchFamily="2" charset="2"/>
-              <a:buChar char="§"/>
-            </a:pPr>
-            <a:r>
-              <a:rPr lang="it-IT" sz="2000" dirty="0">
-                <a:latin typeface="Franklin Gothic Book" panose="020B0503020102020204" pitchFamily="34" charset="0"/>
-              </a:rPr>
-              <a:t>Correlazione dei video effettuata staticamente. </a:t>
-            </a:r>
-            <a:br>
-              <a:rPr lang="it-IT" sz="2000" dirty="0">
-                <a:latin typeface="Franklin Gothic Book" panose="020B0503020102020204" pitchFamily="34" charset="0"/>
-              </a:rPr>
-            </a:br>
-            <a:r>
-              <a:rPr lang="it-IT" sz="2000" dirty="0">
-                <a:latin typeface="Franklin Gothic Book" panose="020B0503020102020204" pitchFamily="34" charset="0"/>
-              </a:rPr>
-              <a:t>Non avviene una correlazione basata su altri parametri e/o algoritmi.</a:t>
-            </a:r>
-          </a:p>
-          <a:p>
-            <a:pPr marL="285750" indent="-285750">
-              <a:buFont typeface="Wingdings" panose="05000000000000000000" pitchFamily="2" charset="2"/>
-              <a:buChar char="§"/>
-            </a:pPr>
-            <a:endParaRPr lang="it-IT" sz="2000" dirty="0">
-              <a:latin typeface="Franklin Gothic Book" panose="020B0503020102020204" pitchFamily="34" charset="0"/>
-            </a:endParaRPr>
-          </a:p>
-          <a:p>
-            <a:pPr marL="285750" indent="-285750">
-              <a:buFont typeface="Wingdings" panose="05000000000000000000" pitchFamily="2" charset="2"/>
-              <a:buChar char="§"/>
-            </a:pPr>
-            <a:r>
-              <a:rPr lang="it-IT" sz="2000" dirty="0">
-                <a:latin typeface="Franklin Gothic Book" panose="020B0503020102020204" pitchFamily="34" charset="0"/>
-              </a:rPr>
-              <a:t>Ogni minimo update implica un aggiornamento di tutto il database.</a:t>
-            </a:r>
-            <a:endParaRPr lang="it-IT" dirty="0">
-              <a:latin typeface="Franklin Gothic Book" panose="020B0503020102020204" pitchFamily="34" charset="0"/>
-            </a:endParaRPr>
+                <a:latin typeface="Franklin Gothic Demi" panose="020B0703020102020204" pitchFamily="34" charset="0"/>
+              </a:rPr>
+              <a:t>VOTE_USER</a:t>
+            </a:r>
+          </a:p>
+        </p:txBody>
+      </p:sp>
+      <p:sp>
+        <p:nvSpPr>
+          <p:cNvPr id="14" name="CasellaDiTesto 13">
+            <a:extLst>
+              <a:ext uri="{FF2B5EF4-FFF2-40B4-BE49-F238E27FC236}">
+                <a16:creationId xmlns:a16="http://schemas.microsoft.com/office/drawing/2014/main" id="{43539FA4-0B94-4E8B-A351-B25914F89B49}"/>
+              </a:ext>
+            </a:extLst>
+          </p:cNvPr>
+          <p:cNvSpPr txBox="1"/>
+          <p:nvPr/>
+        </p:nvSpPr>
+        <p:spPr>
+          <a:xfrm>
+            <a:off x="4426851" y="4127808"/>
+            <a:ext cx="7546483" cy="1938992"/>
+          </a:xfrm>
+          <a:prstGeom prst="rect">
+            <a:avLst/>
+          </a:prstGeom>
+          <a:noFill/>
+        </p:spPr>
+        <p:txBody>
+          <a:bodyPr wrap="square" rtlCol="0">
+            <a:spAutoFit/>
+          </a:bodyPr>
+          <a:lstStyle/>
+          <a:p>
+            <a:r>
+              <a:rPr lang="it-IT" sz="2000" dirty="0"/>
+              <a:t>Fornisce una valutazione complessiva della conferenza.</a:t>
+            </a:r>
+          </a:p>
+          <a:p>
+            <a:endParaRPr lang="it-IT" sz="2000" dirty="0"/>
+          </a:p>
+          <a:p>
+            <a:r>
+              <a:rPr lang="it-IT" sz="2000" dirty="0"/>
+              <a:t>Permette di attribuire un giudizio personale.</a:t>
+            </a:r>
+          </a:p>
+          <a:p>
+            <a:endParaRPr lang="it-IT" sz="2000" dirty="0"/>
+          </a:p>
+          <a:p>
+            <a:r>
+              <a:rPr lang="it-IT" sz="2000" dirty="0"/>
+              <a:t>È essenziale per la creazione di una classifica basata sul parere degli utenti. </a:t>
+            </a:r>
           </a:p>
         </p:txBody>
       </p:sp>
     </p:spTree>
     <p:extLst>
       <p:ext uri="{BB962C8B-B14F-4D97-AF65-F5344CB8AC3E}">
-        <p14:creationId xmlns:p14="http://schemas.microsoft.com/office/powerpoint/2010/main" val="4064390965"/>
+        <p14:creationId xmlns:p14="http://schemas.microsoft.com/office/powerpoint/2010/main" val="3462367110"/>
       </p:ext>
     </p:extLst>
   </p:cSld>
@@ -5966,7 +6390,7 @@
         <p:spPr>
           <a:xfrm>
             <a:off x="218661" y="889576"/>
-            <a:ext cx="4618382" cy="107386"/>
+            <a:ext cx="4208195" cy="107386"/>
           </a:xfrm>
           <a:prstGeom prst="rect">
             <a:avLst/>
@@ -6005,60 +6429,6 @@
       </p:sp>
       <p:sp>
         <p:nvSpPr>
-          <p:cNvPr id="2" name="Segno di addizione 1">
-            <a:extLst>
-              <a:ext uri="{FF2B5EF4-FFF2-40B4-BE49-F238E27FC236}">
-                <a16:creationId xmlns:a16="http://schemas.microsoft.com/office/drawing/2014/main" id="{FC479290-017A-46B7-9DF5-0A3A36E7E0FE}"/>
-              </a:ext>
-            </a:extLst>
-          </p:cNvPr>
-          <p:cNvSpPr/>
-          <p:nvPr/>
-        </p:nvSpPr>
-        <p:spPr>
-          <a:xfrm>
-            <a:off x="11038103" y="0"/>
-            <a:ext cx="888556" cy="888556"/>
-          </a:xfrm>
-          <a:prstGeom prst="mathPlus">
-            <a:avLst>
-              <a:gd name="adj1" fmla="val 18156"/>
-            </a:avLst>
-          </a:prstGeom>
-          <a:solidFill>
-            <a:srgbClr val="FF5050"/>
-          </a:solidFill>
-          <a:ln>
-            <a:noFill/>
-          </a:ln>
-        </p:spPr>
-        <p:style>
-          <a:lnRef idx="2">
-            <a:schemeClr val="accent1">
-              <a:shade val="50000"/>
-            </a:schemeClr>
-          </a:lnRef>
-          <a:fillRef idx="1">
-            <a:schemeClr val="accent1"/>
-          </a:fillRef>
-          <a:effectRef idx="0">
-            <a:schemeClr val="accent1"/>
-          </a:effectRef>
-          <a:fontRef idx="minor">
-            <a:schemeClr val="lt1"/>
-          </a:fontRef>
-        </p:style>
-        <p:txBody>
-          <a:bodyPr rtlCol="0" anchor="ctr"/>
-          <a:lstStyle/>
-          <a:p>
-            <a:pPr algn="ctr"/>
-            <a:endParaRPr lang="it-IT"/>
-          </a:p>
-        </p:txBody>
-      </p:sp>
-      <p:sp>
-        <p:nvSpPr>
           <p:cNvPr id="3" name="CasellaDiTesto 2">
             <a:extLst>
               <a:ext uri="{FF2B5EF4-FFF2-40B4-BE49-F238E27FC236}">
@@ -6072,7 +6442,7 @@
         <p:spPr>
           <a:xfrm>
             <a:off x="218660" y="172279"/>
-            <a:ext cx="4618383" cy="584775"/>
+            <a:ext cx="4208195" cy="584775"/>
           </a:xfrm>
           <a:prstGeom prst="rect">
             <a:avLst/>
@@ -6096,17 +6466,17 @@
                 </a:solidFill>
                 <a:latin typeface="Franklin Gothic Demi" panose="020B0703020102020204" pitchFamily="34" charset="0"/>
               </a:rPr>
-              <a:t>POSSIBILI EVOLUZIONI</a:t>
-            </a:r>
-          </a:p>
-        </p:txBody>
-      </p:sp>
-      <p:sp>
-        <p:nvSpPr>
-          <p:cNvPr id="5" name="CasellaDiTesto 4">
-            <a:extLst>
-              <a:ext uri="{FF2B5EF4-FFF2-40B4-BE49-F238E27FC236}">
-                <a16:creationId xmlns:a16="http://schemas.microsoft.com/office/drawing/2014/main" id="{0D02214C-A1DB-404F-940A-202FB5A0E198}"/>
+              <a:t>CRITICITÀ TECNICHE</a:t>
+            </a:r>
+          </a:p>
+        </p:txBody>
+      </p:sp>
+      <p:sp>
+        <p:nvSpPr>
+          <p:cNvPr id="4" name="CasellaDiTesto 3">
+            <a:extLst>
+              <a:ext uri="{FF2B5EF4-FFF2-40B4-BE49-F238E27FC236}">
+                <a16:creationId xmlns:a16="http://schemas.microsoft.com/office/drawing/2014/main" id="{203C8D73-B29A-4888-8269-0AD9DBF85695}"/>
               </a:ext>
             </a:extLst>
           </p:cNvPr>
@@ -6115,8 +6485,8 @@
         </p:nvSpPr>
         <p:spPr>
           <a:xfrm>
-            <a:off x="980809" y="1690062"/>
-            <a:ext cx="6890833" cy="3477875"/>
+            <a:off x="1035326" y="1597997"/>
+            <a:ext cx="10121348" cy="4370427"/>
           </a:xfrm>
           <a:prstGeom prst="rect">
             <a:avLst/>
@@ -6137,7 +6507,46 @@
               <a:rPr lang="it-IT" sz="2000" dirty="0">
                 <a:latin typeface="Franklin Gothic Book" panose="020B0503020102020204" pitchFamily="34" charset="0"/>
               </a:rPr>
-              <a:t>Script per aggiornamento automatico del dataset dei Talk, basato sui dati ufficiali del sito TED.</a:t>
+              <a:t>L’aggiornamento dei dati relativi alla correlazione dei talk è svolto in maniera manuale.</a:t>
+            </a:r>
+          </a:p>
+          <a:p>
+            <a:endParaRPr lang="it-IT" sz="2000" dirty="0">
+              <a:latin typeface="Franklin Gothic Book" panose="020B0503020102020204" pitchFamily="34" charset="0"/>
+            </a:endParaRPr>
+          </a:p>
+          <a:p>
+            <a:pPr marL="285750" indent="-285750">
+              <a:buFont typeface="Wingdings" panose="05000000000000000000" pitchFamily="2" charset="2"/>
+              <a:buChar char="§"/>
+            </a:pPr>
+            <a:r>
+              <a:rPr lang="it-IT" sz="2000" dirty="0">
+                <a:latin typeface="Franklin Gothic Book" panose="020B0503020102020204" pitchFamily="34" charset="0"/>
+              </a:rPr>
+              <a:t>Un secondo aggiornamento da tenere in considerazione è quello relativo</a:t>
+            </a:r>
+            <a:br>
+              <a:rPr lang="it-IT" sz="2000" dirty="0">
+                <a:latin typeface="Franklin Gothic Book" panose="020B0503020102020204" pitchFamily="34" charset="0"/>
+              </a:rPr>
+            </a:br>
+            <a:r>
+              <a:rPr lang="it-IT" sz="2000" dirty="0">
+                <a:latin typeface="Franklin Gothic Book" panose="020B0503020102020204" pitchFamily="34" charset="0"/>
+              </a:rPr>
+              <a:t>all’area geografica, siccome sono dati aggiuntivi.</a:t>
+            </a:r>
+            <a:br>
+              <a:rPr lang="it-IT" sz="2000" dirty="0">
+                <a:latin typeface="Franklin Gothic Book" panose="020B0503020102020204" pitchFamily="34" charset="0"/>
+              </a:rPr>
+            </a:br>
+            <a:r>
+              <a:rPr lang="it-IT" sz="2000" dirty="0">
+                <a:latin typeface="Franklin Gothic Book" panose="020B0503020102020204" pitchFamily="34" charset="0"/>
+              </a:rPr>
+              <a:t>Anche in questo caso, l’aggiornamento risulta statico.</a:t>
             </a:r>
           </a:p>
           <a:p>
@@ -6158,7 +6567,18 @@
               <a:rPr lang="it-IT" sz="2000" dirty="0">
                 <a:latin typeface="Franklin Gothic Book" panose="020B0503020102020204" pitchFamily="34" charset="0"/>
               </a:rPr>
-              <a:t>Implementazione algoritmo per correlazione video basata su parametri.</a:t>
+              <a:t>Correlazione dei video effettuata staticamente. </a:t>
+            </a:r>
+            <a:br>
+              <a:rPr lang="it-IT" sz="2000" dirty="0">
+                <a:latin typeface="Franklin Gothic Book" panose="020B0503020102020204" pitchFamily="34" charset="0"/>
+              </a:rPr>
+            </a:br>
+            <a:r>
+              <a:rPr lang="it-IT" sz="2000" dirty="0">
+                <a:latin typeface="Franklin Gothic Book" panose="020B0503020102020204" pitchFamily="34" charset="0"/>
+              </a:rPr>
+              <a:t>Non avviene una correlazione basata su altri parametri e/o algoritmi.</a:t>
             </a:r>
           </a:p>
           <a:p>
@@ -6179,14 +6599,33 @@
               <a:rPr lang="it-IT" sz="2000" dirty="0">
                 <a:latin typeface="Franklin Gothic Book" panose="020B0503020102020204" pitchFamily="34" charset="0"/>
               </a:rPr>
-              <a:t>Script per aggiornamento automatico del dataset dei Talk, relativo all’area geografica.</a:t>
-            </a:r>
+              <a:t>Ogni minimo update implica un aggiornamento di tutto il database.</a:t>
+            </a:r>
+            <a:br>
+              <a:rPr lang="it-IT" sz="2000" dirty="0">
+                <a:latin typeface="Franklin Gothic Book" panose="020B0503020102020204" pitchFamily="34" charset="0"/>
+              </a:rPr>
+            </a:br>
+            <a:endParaRPr lang="it-IT" sz="2000" dirty="0">
+              <a:latin typeface="Franklin Gothic Book" panose="020B0503020102020204" pitchFamily="34" charset="0"/>
+            </a:endParaRPr>
           </a:p>
           <a:p>
             <a:pPr marL="285750" indent="-285750">
               <a:buFont typeface="Wingdings" panose="05000000000000000000" pitchFamily="2" charset="2"/>
               <a:buChar char="§"/>
             </a:pPr>
+            <a:r>
+              <a:rPr lang="it-IT" sz="2000" dirty="0">
+                <a:latin typeface="Franklin Gothic Book" panose="020B0503020102020204" pitchFamily="34" charset="0"/>
+              </a:rPr>
+              <a:t>Possibilità di incongruenze nel dataset.</a:t>
+            </a:r>
+            <a:br>
+              <a:rPr lang="it-IT" sz="2000" dirty="0">
+                <a:latin typeface="Franklin Gothic Book" panose="020B0503020102020204" pitchFamily="34" charset="0"/>
+              </a:rPr>
+            </a:br>
             <a:endParaRPr lang="it-IT" sz="2000" dirty="0">
               <a:latin typeface="Franklin Gothic Book" panose="020B0503020102020204" pitchFamily="34" charset="0"/>
             </a:endParaRPr>
@@ -6200,15 +6639,18 @@
               <a:rPr lang="it-IT" sz="2000" dirty="0">
                 <a:latin typeface="Franklin Gothic Book" panose="020B0503020102020204" pitchFamily="34" charset="0"/>
               </a:rPr>
-              <a:t>Gestione migliorata del dataset in termini di nuovi elementi e di update di poco impatto.</a:t>
-            </a:r>
+              <a:t>Alto tempo di importazione dei nuovi dataset.</a:t>
+            </a:r>
+            <a:endParaRPr lang="it-IT" dirty="0">
+              <a:latin typeface="Franklin Gothic Book" panose="020B0503020102020204" pitchFamily="34" charset="0"/>
+            </a:endParaRPr>
           </a:p>
         </p:txBody>
       </p:sp>
     </p:spTree>
     <p:extLst>
       <p:ext uri="{BB962C8B-B14F-4D97-AF65-F5344CB8AC3E}">
-        <p14:creationId xmlns:p14="http://schemas.microsoft.com/office/powerpoint/2010/main" val="1796198511"/>
+        <p14:creationId xmlns:p14="http://schemas.microsoft.com/office/powerpoint/2010/main" val="4064390965"/>
       </p:ext>
     </p:extLst>
   </p:cSld>
@@ -6302,7 +6744,7 @@
         <p:spPr>
           <a:xfrm>
             <a:off x="218661" y="889576"/>
-            <a:ext cx="4208195" cy="107386"/>
+            <a:ext cx="4618382" cy="107386"/>
           </a:xfrm>
           <a:prstGeom prst="rect">
             <a:avLst/>
@@ -6408,7 +6850,7 @@
         <p:spPr>
           <a:xfrm>
             <a:off x="218660" y="172279"/>
-            <a:ext cx="4208195" cy="584775"/>
+            <a:ext cx="4618383" cy="584775"/>
           </a:xfrm>
           <a:prstGeom prst="rect">
             <a:avLst/>
@@ -6432,7 +6874,151 @@
                 </a:solidFill>
                 <a:latin typeface="Franklin Gothic Demi" panose="020B0703020102020204" pitchFamily="34" charset="0"/>
               </a:rPr>
-              <a:t>AGGIUNTA DATASET</a:t>
+              <a:t>POSSIBILI EVOLUZIONI</a:t>
+            </a:r>
+          </a:p>
+        </p:txBody>
+      </p:sp>
+      <p:sp>
+        <p:nvSpPr>
+          <p:cNvPr id="5" name="CasellaDiTesto 4">
+            <a:extLst>
+              <a:ext uri="{FF2B5EF4-FFF2-40B4-BE49-F238E27FC236}">
+                <a16:creationId xmlns:a16="http://schemas.microsoft.com/office/drawing/2014/main" id="{0D02214C-A1DB-404F-940A-202FB5A0E198}"/>
+              </a:ext>
+            </a:extLst>
+          </p:cNvPr>
+          <p:cNvSpPr txBox="1"/>
+          <p:nvPr/>
+        </p:nvSpPr>
+        <p:spPr>
+          <a:xfrm>
+            <a:off x="2650583" y="1447949"/>
+            <a:ext cx="6890833" cy="5016758"/>
+          </a:xfrm>
+          <a:prstGeom prst="rect">
+            <a:avLst/>
+          </a:prstGeom>
+          <a:noFill/>
+        </p:spPr>
+        <p:txBody>
+          <a:bodyPr wrap="square" rtlCol="0">
+            <a:spAutoFit/>
+          </a:bodyPr>
+          <a:lstStyle/>
+          <a:p>
+            <a:pPr marL="285750" indent="-285750">
+              <a:buFont typeface="Wingdings" panose="05000000000000000000" pitchFamily="2" charset="2"/>
+              <a:buChar char="§"/>
+            </a:pPr>
+            <a:r>
+              <a:rPr lang="it-IT" sz="2000" dirty="0">
+                <a:latin typeface="Franklin Gothic Book" panose="020B0503020102020204" pitchFamily="34" charset="0"/>
+              </a:rPr>
+              <a:t>Script per aggiornamento automatico del dataset dei Talk, basato sui dati ufficiali del sito TED.</a:t>
+            </a:r>
+          </a:p>
+          <a:p>
+            <a:pPr marL="285750" indent="-285750">
+              <a:buFont typeface="Wingdings" panose="05000000000000000000" pitchFamily="2" charset="2"/>
+              <a:buChar char="§"/>
+            </a:pPr>
+            <a:endParaRPr lang="it-IT" sz="2000" dirty="0">
+              <a:latin typeface="Franklin Gothic Book" panose="020B0503020102020204" pitchFamily="34" charset="0"/>
+            </a:endParaRPr>
+          </a:p>
+          <a:p>
+            <a:pPr marL="285750" indent="-285750">
+              <a:buFont typeface="Wingdings" panose="05000000000000000000" pitchFamily="2" charset="2"/>
+              <a:buChar char="§"/>
+            </a:pPr>
+            <a:r>
+              <a:rPr lang="it-IT" sz="2000" dirty="0">
+                <a:latin typeface="Franklin Gothic Book" panose="020B0503020102020204" pitchFamily="34" charset="0"/>
+              </a:rPr>
+              <a:t>Implementazione algoritmo per correlazione video basata su parametri.</a:t>
+            </a:r>
+          </a:p>
+          <a:p>
+            <a:pPr marL="285750" indent="-285750">
+              <a:buFont typeface="Wingdings" panose="05000000000000000000" pitchFamily="2" charset="2"/>
+              <a:buChar char="§"/>
+            </a:pPr>
+            <a:endParaRPr lang="it-IT" sz="2000" dirty="0">
+              <a:latin typeface="Franklin Gothic Book" panose="020B0503020102020204" pitchFamily="34" charset="0"/>
+            </a:endParaRPr>
+          </a:p>
+          <a:p>
+            <a:pPr marL="285750" indent="-285750">
+              <a:buFont typeface="Wingdings" panose="05000000000000000000" pitchFamily="2" charset="2"/>
+              <a:buChar char="§"/>
+            </a:pPr>
+            <a:r>
+              <a:rPr lang="it-IT" sz="2000" dirty="0">
+                <a:latin typeface="Franklin Gothic Book" panose="020B0503020102020204" pitchFamily="34" charset="0"/>
+              </a:rPr>
+              <a:t>Script per aggiornamento automatico del dataset dei Talk, relativo all’area geografica e ai voti.</a:t>
+            </a:r>
+          </a:p>
+          <a:p>
+            <a:pPr marL="285750" indent="-285750">
+              <a:buFont typeface="Wingdings" panose="05000000000000000000" pitchFamily="2" charset="2"/>
+              <a:buChar char="§"/>
+            </a:pPr>
+            <a:endParaRPr lang="it-IT" sz="2000" dirty="0">
+              <a:latin typeface="Franklin Gothic Book" panose="020B0503020102020204" pitchFamily="34" charset="0"/>
+            </a:endParaRPr>
+          </a:p>
+          <a:p>
+            <a:pPr marL="285750" indent="-285750">
+              <a:buFont typeface="Wingdings" panose="05000000000000000000" pitchFamily="2" charset="2"/>
+              <a:buChar char="§"/>
+            </a:pPr>
+            <a:r>
+              <a:rPr lang="it-IT" sz="2000" dirty="0">
+                <a:latin typeface="Franklin Gothic Book" panose="020B0503020102020204" pitchFamily="34" charset="0"/>
+              </a:rPr>
+              <a:t>Gestione migliorata del dataset in termini di nuovi elementi e di update di poco impatto.</a:t>
+            </a:r>
+            <a:br>
+              <a:rPr lang="it-IT" sz="2000" dirty="0">
+                <a:latin typeface="Franklin Gothic Book" panose="020B0503020102020204" pitchFamily="34" charset="0"/>
+              </a:rPr>
+            </a:br>
+            <a:endParaRPr lang="it-IT" sz="2000" dirty="0">
+              <a:latin typeface="Franklin Gothic Book" panose="020B0503020102020204" pitchFamily="34" charset="0"/>
+            </a:endParaRPr>
+          </a:p>
+          <a:p>
+            <a:pPr marL="285750" indent="-285750">
+              <a:buFont typeface="Wingdings" panose="05000000000000000000" pitchFamily="2" charset="2"/>
+              <a:buChar char="§"/>
+            </a:pPr>
+            <a:r>
+              <a:rPr lang="it-IT" sz="2000" dirty="0">
+                <a:latin typeface="Franklin Gothic Book" panose="020B0503020102020204" pitchFamily="34" charset="0"/>
+              </a:rPr>
+              <a:t>Implementazione di voto con commento, per specificare meglio il proprio parere.</a:t>
+            </a:r>
+            <a:br>
+              <a:rPr lang="it-IT" sz="2000" dirty="0">
+                <a:latin typeface="Franklin Gothic Book" panose="020B0503020102020204" pitchFamily="34" charset="0"/>
+              </a:rPr>
+            </a:br>
+            <a:endParaRPr lang="it-IT" sz="2000" dirty="0">
+              <a:latin typeface="Franklin Gothic Book" panose="020B0503020102020204" pitchFamily="34" charset="0"/>
+            </a:endParaRPr>
+          </a:p>
+          <a:p>
+            <a:pPr marL="285750" indent="-285750">
+              <a:buFont typeface="Wingdings" panose="05000000000000000000" pitchFamily="2" charset="2"/>
+              <a:buChar char="§"/>
+            </a:pPr>
+            <a:r>
+              <a:rPr lang="it-IT" sz="2000" dirty="0">
+                <a:latin typeface="Franklin Gothic Book" panose="020B0503020102020204" pitchFamily="34" charset="0"/>
+              </a:rPr>
+              <a:t>Analisi legate alle valutazioni e alle zone geografiche.</a:t>
             </a:r>
           </a:p>
         </p:txBody>
@@ -6440,7 +7026,7 @@
     </p:spTree>
     <p:extLst>
       <p:ext uri="{BB962C8B-B14F-4D97-AF65-F5344CB8AC3E}">
-        <p14:creationId xmlns:p14="http://schemas.microsoft.com/office/powerpoint/2010/main" val="2595759990"/>
+        <p14:creationId xmlns:p14="http://schemas.microsoft.com/office/powerpoint/2010/main" val="1796198511"/>
       </p:ext>
     </p:extLst>
   </p:cSld>

</xml_diff>